<commit_message>
Added 123rd of content for week3, added excercise
</commit_message>
<xml_diff>
--- a/week3/week3_slideshow.pptx
+++ b/week3/week3_slideshow.pptx
@@ -14,6 +14,12 @@
     <p:sldId id="290" r:id="rId8"/>
     <p:sldId id="291" r:id="rId9"/>
     <p:sldId id="292" r:id="rId10"/>
+    <p:sldId id="293" r:id="rId11"/>
+    <p:sldId id="294" r:id="rId12"/>
+    <p:sldId id="295" r:id="rId13"/>
+    <p:sldId id="296" r:id="rId14"/>
+    <p:sldId id="297" r:id="rId15"/>
+    <p:sldId id="298" r:id="rId16"/>
   </p:sldIdLst>
   <p:sldSz cx="12192000" cy="6858000"/>
   <p:notesSz cx="6858000" cy="9144000"/>
@@ -394,7 +400,7 @@
           <a:p>
             <a:fld id="{34891F7B-7391-4F87-9AA4-1E9AC2164F40}" type="datetimeFigureOut">
               <a:rPr lang="en-US" smtClean="0"/>
-              <a:t>2/10/2022</a:t>
+              <a:t>2/11/2022</a:t>
             </a:fld>
             <a:endParaRPr lang="en-US"/>
           </a:p>
@@ -808,7 +814,7 @@
           <a:p>
             <a:fld id="{34891F7B-7391-4F87-9AA4-1E9AC2164F40}" type="datetimeFigureOut">
               <a:rPr lang="en-US" smtClean="0"/>
-              <a:t>2/10/2022</a:t>
+              <a:t>2/11/2022</a:t>
             </a:fld>
             <a:endParaRPr lang="en-US"/>
           </a:p>
@@ -1144,7 +1150,7 @@
           <a:p>
             <a:fld id="{34891F7B-7391-4F87-9AA4-1E9AC2164F40}" type="datetimeFigureOut">
               <a:rPr lang="en-US" smtClean="0"/>
-              <a:t>2/10/2022</a:t>
+              <a:t>2/11/2022</a:t>
             </a:fld>
             <a:endParaRPr lang="en-US"/>
           </a:p>
@@ -1549,7 +1555,7 @@
           <a:p>
             <a:fld id="{34891F7B-7391-4F87-9AA4-1E9AC2164F40}" type="datetimeFigureOut">
               <a:rPr lang="en-US" smtClean="0"/>
-              <a:t>2/10/2022</a:t>
+              <a:t>2/11/2022</a:t>
             </a:fld>
             <a:endParaRPr lang="en-US"/>
           </a:p>
@@ -2117,7 +2123,7 @@
           <a:p>
             <a:fld id="{34891F7B-7391-4F87-9AA4-1E9AC2164F40}" type="datetimeFigureOut">
               <a:rPr lang="en-US" smtClean="0"/>
-              <a:t>2/10/2022</a:t>
+              <a:t>2/11/2022</a:t>
             </a:fld>
             <a:endParaRPr lang="en-US"/>
           </a:p>
@@ -2798,7 +2804,7 @@
           <a:p>
             <a:fld id="{34891F7B-7391-4F87-9AA4-1E9AC2164F40}" type="datetimeFigureOut">
               <a:rPr lang="en-US" smtClean="0"/>
-              <a:t>2/10/2022</a:t>
+              <a:t>2/11/2022</a:t>
             </a:fld>
             <a:endParaRPr lang="en-US"/>
           </a:p>
@@ -3711,7 +3717,7 @@
           <a:p>
             <a:fld id="{34891F7B-7391-4F87-9AA4-1E9AC2164F40}" type="datetimeFigureOut">
               <a:rPr lang="en-US" smtClean="0"/>
-              <a:t>2/10/2022</a:t>
+              <a:t>2/11/2022</a:t>
             </a:fld>
             <a:endParaRPr lang="en-US"/>
           </a:p>
@@ -4024,7 +4030,7 @@
           <a:p>
             <a:fld id="{34891F7B-7391-4F87-9AA4-1E9AC2164F40}" type="datetimeFigureOut">
               <a:rPr lang="en-US" smtClean="0"/>
-              <a:t>2/10/2022</a:t>
+              <a:t>2/11/2022</a:t>
             </a:fld>
             <a:endParaRPr lang="en-US"/>
           </a:p>
@@ -4288,7 +4294,7 @@
           <a:p>
             <a:fld id="{34891F7B-7391-4F87-9AA4-1E9AC2164F40}" type="datetimeFigureOut">
               <a:rPr lang="en-US" smtClean="0"/>
-              <a:t>2/10/2022</a:t>
+              <a:t>2/11/2022</a:t>
             </a:fld>
             <a:endParaRPr lang="en-US"/>
           </a:p>
@@ -4637,7 +4643,7 @@
           <a:p>
             <a:fld id="{34891F7B-7391-4F87-9AA4-1E9AC2164F40}" type="datetimeFigureOut">
               <a:rPr lang="en-US" smtClean="0"/>
-              <a:t>2/10/2022</a:t>
+              <a:t>2/11/2022</a:t>
             </a:fld>
             <a:endParaRPr lang="en-US"/>
           </a:p>
@@ -4951,7 +4957,7 @@
           <a:p>
             <a:fld id="{34891F7B-7391-4F87-9AA4-1E9AC2164F40}" type="datetimeFigureOut">
               <a:rPr lang="en-US" smtClean="0"/>
-              <a:t>2/10/2022</a:t>
+              <a:t>2/11/2022</a:t>
             </a:fld>
             <a:endParaRPr lang="en-US"/>
           </a:p>
@@ -5260,7 +5266,7 @@
           <a:p>
             <a:fld id="{34891F7B-7391-4F87-9AA4-1E9AC2164F40}" type="datetimeFigureOut">
               <a:rPr lang="en-US" smtClean="0"/>
-              <a:t>2/10/2022</a:t>
+              <a:t>2/11/2022</a:t>
             </a:fld>
             <a:endParaRPr lang="en-US"/>
           </a:p>
@@ -5649,7 +5655,7 @@
           <a:p>
             <a:fld id="{34891F7B-7391-4F87-9AA4-1E9AC2164F40}" type="datetimeFigureOut">
               <a:rPr lang="en-US" smtClean="0"/>
-              <a:t>2/10/2022</a:t>
+              <a:t>2/11/2022</a:t>
             </a:fld>
             <a:endParaRPr lang="en-US"/>
           </a:p>
@@ -6025,7 +6031,7 @@
           <a:p>
             <a:fld id="{34891F7B-7391-4F87-9AA4-1E9AC2164F40}" type="datetimeFigureOut">
               <a:rPr lang="en-US" smtClean="0"/>
-              <a:t>2/10/2022</a:t>
+              <a:t>2/11/2022</a:t>
             </a:fld>
             <a:endParaRPr lang="en-US"/>
           </a:p>
@@ -6531,7 +6537,7 @@
           <a:p>
             <a:fld id="{34891F7B-7391-4F87-9AA4-1E9AC2164F40}" type="datetimeFigureOut">
               <a:rPr lang="en-US" smtClean="0"/>
-              <a:t>2/10/2022</a:t>
+              <a:t>2/11/2022</a:t>
             </a:fld>
             <a:endParaRPr lang="en-US"/>
           </a:p>
@@ -6788,7 +6794,7 @@
           <a:p>
             <a:fld id="{34891F7B-7391-4F87-9AA4-1E9AC2164F40}" type="datetimeFigureOut">
               <a:rPr lang="en-US" smtClean="0"/>
-              <a:t>2/10/2022</a:t>
+              <a:t>2/11/2022</a:t>
             </a:fld>
             <a:endParaRPr lang="en-US"/>
           </a:p>
@@ -6951,7 +6957,7 @@
           <a:p>
             <a:fld id="{34891F7B-7391-4F87-9AA4-1E9AC2164F40}" type="datetimeFigureOut">
               <a:rPr lang="en-US" smtClean="0"/>
-              <a:t>2/10/2022</a:t>
+              <a:t>2/11/2022</a:t>
             </a:fld>
             <a:endParaRPr lang="en-US"/>
           </a:p>
@@ -7341,7 +7347,7 @@
           <a:p>
             <a:fld id="{34891F7B-7391-4F87-9AA4-1E9AC2164F40}" type="datetimeFigureOut">
               <a:rPr lang="en-US" smtClean="0"/>
-              <a:t>2/10/2022</a:t>
+              <a:t>2/11/2022</a:t>
             </a:fld>
             <a:endParaRPr lang="en-US"/>
           </a:p>
@@ -7750,7 +7756,7 @@
           <a:p>
             <a:fld id="{34891F7B-7391-4F87-9AA4-1E9AC2164F40}" type="datetimeFigureOut">
               <a:rPr lang="en-US" smtClean="0"/>
-              <a:t>2/10/2022</a:t>
+              <a:t>2/11/2022</a:t>
             </a:fld>
             <a:endParaRPr lang="en-US"/>
           </a:p>
@@ -8159,7 +8165,7 @@
           <a:p>
             <a:fld id="{34891F7B-7391-4F87-9AA4-1E9AC2164F40}" type="datetimeFigureOut">
               <a:rPr lang="en-US" smtClean="0"/>
-              <a:t>2/10/2022</a:t>
+              <a:t>2/11/2022</a:t>
             </a:fld>
             <a:endParaRPr lang="en-US"/>
           </a:p>
@@ -8495,7 +8501,7 @@
           <a:p>
             <a:fld id="{34891F7B-7391-4F87-9AA4-1E9AC2164F40}" type="datetimeFigureOut">
               <a:rPr lang="en-US" smtClean="0"/>
-              <a:t>2/10/2022</a:t>
+              <a:t>2/11/2022</a:t>
             </a:fld>
             <a:endParaRPr lang="en-US"/>
           </a:p>
@@ -8900,7 +8906,7 @@
           <a:p>
             <a:fld id="{34891F7B-7391-4F87-9AA4-1E9AC2164F40}" type="datetimeFigureOut">
               <a:rPr lang="en-US" smtClean="0"/>
-              <a:t>2/10/2022</a:t>
+              <a:t>2/11/2022</a:t>
             </a:fld>
             <a:endParaRPr lang="en-US"/>
           </a:p>
@@ -9526,7 +9532,7 @@
           <a:p>
             <a:fld id="{34891F7B-7391-4F87-9AA4-1E9AC2164F40}" type="datetimeFigureOut">
               <a:rPr lang="en-US" smtClean="0"/>
-              <a:t>2/10/2022</a:t>
+              <a:t>2/11/2022</a:t>
             </a:fld>
             <a:endParaRPr lang="en-US"/>
           </a:p>
@@ -9862,7 +9868,7 @@
           <a:p>
             <a:fld id="{34891F7B-7391-4F87-9AA4-1E9AC2164F40}" type="datetimeFigureOut">
               <a:rPr lang="en-US" smtClean="0"/>
-              <a:t>2/10/2022</a:t>
+              <a:t>2/11/2022</a:t>
             </a:fld>
             <a:endParaRPr lang="en-US"/>
           </a:p>
@@ -10543,7 +10549,7 @@
           <a:p>
             <a:fld id="{34891F7B-7391-4F87-9AA4-1E9AC2164F40}" type="datetimeFigureOut">
               <a:rPr lang="en-US" smtClean="0"/>
-              <a:t>2/10/2022</a:t>
+              <a:t>2/11/2022</a:t>
             </a:fld>
             <a:endParaRPr lang="en-US"/>
           </a:p>
@@ -11456,7 +11462,7 @@
           <a:p>
             <a:fld id="{34891F7B-7391-4F87-9AA4-1E9AC2164F40}" type="datetimeFigureOut">
               <a:rPr lang="en-US" smtClean="0"/>
-              <a:t>2/10/2022</a:t>
+              <a:t>2/11/2022</a:t>
             </a:fld>
             <a:endParaRPr lang="en-US"/>
           </a:p>
@@ -11769,7 +11775,7 @@
           <a:p>
             <a:fld id="{34891F7B-7391-4F87-9AA4-1E9AC2164F40}" type="datetimeFigureOut">
               <a:rPr lang="en-US" smtClean="0"/>
-              <a:t>2/10/2022</a:t>
+              <a:t>2/11/2022</a:t>
             </a:fld>
             <a:endParaRPr lang="en-US"/>
           </a:p>
@@ -12033,7 +12039,7 @@
           <a:p>
             <a:fld id="{34891F7B-7391-4F87-9AA4-1E9AC2164F40}" type="datetimeFigureOut">
               <a:rPr lang="en-US" smtClean="0"/>
-              <a:t>2/10/2022</a:t>
+              <a:t>2/11/2022</a:t>
             </a:fld>
             <a:endParaRPr lang="en-US"/>
           </a:p>
@@ -12418,7 +12424,7 @@
           <a:p>
             <a:fld id="{34891F7B-7391-4F87-9AA4-1E9AC2164F40}" type="datetimeFigureOut">
               <a:rPr lang="en-US" smtClean="0"/>
-              <a:t>2/10/2022</a:t>
+              <a:t>2/11/2022</a:t>
             </a:fld>
             <a:endParaRPr lang="en-US"/>
           </a:p>
@@ -12924,7 +12930,7 @@
           <a:p>
             <a:fld id="{34891F7B-7391-4F87-9AA4-1E9AC2164F40}" type="datetimeFigureOut">
               <a:rPr lang="en-US" smtClean="0"/>
-              <a:t>2/10/2022</a:t>
+              <a:t>2/11/2022</a:t>
             </a:fld>
             <a:endParaRPr lang="en-US"/>
           </a:p>
@@ -13181,7 +13187,7 @@
           <a:p>
             <a:fld id="{34891F7B-7391-4F87-9AA4-1E9AC2164F40}" type="datetimeFigureOut">
               <a:rPr lang="en-US" smtClean="0"/>
-              <a:t>2/10/2022</a:t>
+              <a:t>2/11/2022</a:t>
             </a:fld>
             <a:endParaRPr lang="en-US"/>
           </a:p>
@@ -13344,7 +13350,7 @@
           <a:p>
             <a:fld id="{34891F7B-7391-4F87-9AA4-1E9AC2164F40}" type="datetimeFigureOut">
               <a:rPr lang="en-US" smtClean="0"/>
-              <a:t>2/10/2022</a:t>
+              <a:t>2/11/2022</a:t>
             </a:fld>
             <a:endParaRPr lang="en-US"/>
           </a:p>
@@ -13734,7 +13740,7 @@
           <a:p>
             <a:fld id="{34891F7B-7391-4F87-9AA4-1E9AC2164F40}" type="datetimeFigureOut">
               <a:rPr lang="en-US" smtClean="0"/>
-              <a:t>2/10/2022</a:t>
+              <a:t>2/11/2022</a:t>
             </a:fld>
             <a:endParaRPr lang="en-US"/>
           </a:p>
@@ -14143,7 +14149,7 @@
           <a:p>
             <a:fld id="{34891F7B-7391-4F87-9AA4-1E9AC2164F40}" type="datetimeFigureOut">
               <a:rPr lang="en-US" smtClean="0"/>
-              <a:t>2/10/2022</a:t>
+              <a:t>2/11/2022</a:t>
             </a:fld>
             <a:endParaRPr lang="en-US"/>
           </a:p>
@@ -14387,7 +14393,7 @@
           <a:p>
             <a:fld id="{34891F7B-7391-4F87-9AA4-1E9AC2164F40}" type="datetimeFigureOut">
               <a:rPr lang="en-US" smtClean="0"/>
-              <a:t>2/10/2022</a:t>
+              <a:t>2/11/2022</a:t>
             </a:fld>
             <a:endParaRPr lang="en-US"/>
           </a:p>
@@ -14964,7 +14970,7 @@
           <a:p>
             <a:fld id="{34891F7B-7391-4F87-9AA4-1E9AC2164F40}" type="datetimeFigureOut">
               <a:rPr lang="en-US" smtClean="0"/>
-              <a:t>2/10/2022</a:t>
+              <a:t>2/11/2022</a:t>
             </a:fld>
             <a:endParaRPr lang="en-US"/>
           </a:p>
@@ -15398,7 +15404,7 @@
           <a:p>
             <a:r>
               <a:rPr lang="en-US" dirty="0"/>
-              <a:t>Dart Week 2</a:t>
+              <a:t>Dart Week 3</a:t>
             </a:r>
           </a:p>
         </p:txBody>
@@ -15432,6 +15438,1113 @@
     <p:extLst>
       <p:ext uri="{BB962C8B-B14F-4D97-AF65-F5344CB8AC3E}">
         <p14:creationId xmlns:p14="http://schemas.microsoft.com/office/powerpoint/2010/main" val="3114809883"/>
+      </p:ext>
+    </p:extLst>
+  </p:cSld>
+  <p:clrMapOvr>
+    <a:masterClrMapping/>
+  </p:clrMapOvr>
+</p:sld>
+</file>
+
+<file path=ppt/slides/slide10.xml><?xml version="1.0" encoding="utf-8"?>
+<p:sld xmlns:a="http://schemas.openxmlformats.org/drawingml/2006/main" xmlns:r="http://schemas.openxmlformats.org/officeDocument/2006/relationships" xmlns:p="http://schemas.openxmlformats.org/presentationml/2006/main">
+  <p:cSld>
+    <p:spTree>
+      <p:nvGrpSpPr>
+        <p:cNvPr id="1" name=""/>
+        <p:cNvGrpSpPr/>
+        <p:nvPr/>
+      </p:nvGrpSpPr>
+      <p:grpSpPr>
+        <a:xfrm>
+          <a:off x="0" y="0"/>
+          <a:ext cx="0" cy="0"/>
+          <a:chOff x="0" y="0"/>
+          <a:chExt cx="0" cy="0"/>
+        </a:xfrm>
+      </p:grpSpPr>
+      <p:sp>
+        <p:nvSpPr>
+          <p:cNvPr id="2" name="Title 1">
+            <a:extLst>
+              <a:ext uri="{FF2B5EF4-FFF2-40B4-BE49-F238E27FC236}">
+                <a16:creationId xmlns:a16="http://schemas.microsoft.com/office/drawing/2014/main" id="{764356C1-CA34-4517-A3EC-F91F2717C5BF}"/>
+              </a:ext>
+            </a:extLst>
+          </p:cNvPr>
+          <p:cNvSpPr>
+            <a:spLocks noGrp="1"/>
+          </p:cNvSpPr>
+          <p:nvPr>
+            <p:ph type="title"/>
+          </p:nvPr>
+        </p:nvSpPr>
+        <p:spPr/>
+        <p:txBody>
+          <a:bodyPr/>
+          <a:lstStyle/>
+          <a:p>
+            <a:r>
+              <a:rPr lang="en-US" dirty="0"/>
+              <a:t>Classes: Inheritance</a:t>
+            </a:r>
+          </a:p>
+        </p:txBody>
+      </p:sp>
+      <p:sp>
+        <p:nvSpPr>
+          <p:cNvPr id="3" name="Content Placeholder 2">
+            <a:extLst>
+              <a:ext uri="{FF2B5EF4-FFF2-40B4-BE49-F238E27FC236}">
+                <a16:creationId xmlns:a16="http://schemas.microsoft.com/office/drawing/2014/main" id="{146A0A31-C5A3-48D0-AFE6-51F26B38AFA6}"/>
+              </a:ext>
+            </a:extLst>
+          </p:cNvPr>
+          <p:cNvSpPr>
+            <a:spLocks noGrp="1"/>
+          </p:cNvSpPr>
+          <p:nvPr>
+            <p:ph idx="1"/>
+          </p:nvPr>
+        </p:nvSpPr>
+        <p:spPr/>
+        <p:txBody>
+          <a:bodyPr/>
+          <a:lstStyle/>
+          <a:p>
+            <a:r>
+              <a:rPr lang="en-US" dirty="0"/>
+              <a:t>Abstract classes</a:t>
+            </a:r>
+          </a:p>
+          <a:p>
+            <a:r>
+              <a:rPr lang="en-US" dirty="0"/>
+              <a:t>Polymorphism</a:t>
+            </a:r>
+          </a:p>
+          <a:p>
+            <a:r>
+              <a:rPr lang="en-US" dirty="0"/>
+              <a:t>How to check types</a:t>
+            </a:r>
+          </a:p>
+          <a:p>
+            <a:r>
+              <a:rPr lang="en-US" dirty="0"/>
+              <a:t>Object slicing</a:t>
+            </a:r>
+          </a:p>
+        </p:txBody>
+      </p:sp>
+      <p:pic>
+        <p:nvPicPr>
+          <p:cNvPr id="5" name="Picture 4">
+            <a:extLst>
+              <a:ext uri="{FF2B5EF4-FFF2-40B4-BE49-F238E27FC236}">
+                <a16:creationId xmlns:a16="http://schemas.microsoft.com/office/drawing/2014/main" id="{F59C62C5-E485-4D5D-98B2-8C6A8D0B2569}"/>
+              </a:ext>
+            </a:extLst>
+          </p:cNvPr>
+          <p:cNvPicPr>
+            <a:picLocks noChangeAspect="1"/>
+          </p:cNvPicPr>
+          <p:nvPr/>
+        </p:nvPicPr>
+        <p:blipFill>
+          <a:blip r:embed="rId2"/>
+          <a:stretch>
+            <a:fillRect/>
+          </a:stretch>
+        </p:blipFill>
+        <p:spPr>
+          <a:xfrm>
+            <a:off x="5325333" y="-66734"/>
+            <a:ext cx="6866667" cy="5228571"/>
+          </a:xfrm>
+          <a:prstGeom prst="rect">
+            <a:avLst/>
+          </a:prstGeom>
+        </p:spPr>
+      </p:pic>
+    </p:spTree>
+    <p:extLst>
+      <p:ext uri="{BB962C8B-B14F-4D97-AF65-F5344CB8AC3E}">
+        <p14:creationId xmlns:p14="http://schemas.microsoft.com/office/powerpoint/2010/main" val="214437751"/>
+      </p:ext>
+    </p:extLst>
+  </p:cSld>
+  <p:clrMapOvr>
+    <a:masterClrMapping/>
+  </p:clrMapOvr>
+</p:sld>
+</file>
+
+<file path=ppt/slides/slide11.xml><?xml version="1.0" encoding="utf-8"?>
+<p:sld xmlns:a="http://schemas.openxmlformats.org/drawingml/2006/main" xmlns:r="http://schemas.openxmlformats.org/officeDocument/2006/relationships" xmlns:p="http://schemas.openxmlformats.org/presentationml/2006/main">
+  <p:cSld>
+    <p:spTree>
+      <p:nvGrpSpPr>
+        <p:cNvPr id="1" name=""/>
+        <p:cNvGrpSpPr/>
+        <p:nvPr/>
+      </p:nvGrpSpPr>
+      <p:grpSpPr>
+        <a:xfrm>
+          <a:off x="0" y="0"/>
+          <a:ext cx="0" cy="0"/>
+          <a:chOff x="0" y="0"/>
+          <a:chExt cx="0" cy="0"/>
+        </a:xfrm>
+      </p:grpSpPr>
+      <p:sp>
+        <p:nvSpPr>
+          <p:cNvPr id="2" name="Title 1">
+            <a:extLst>
+              <a:ext uri="{FF2B5EF4-FFF2-40B4-BE49-F238E27FC236}">
+                <a16:creationId xmlns:a16="http://schemas.microsoft.com/office/drawing/2014/main" id="{9CD1FBE8-CB9B-4FDD-814B-C34A6EA6DF2B}"/>
+              </a:ext>
+            </a:extLst>
+          </p:cNvPr>
+          <p:cNvSpPr>
+            <a:spLocks noGrp="1"/>
+          </p:cNvSpPr>
+          <p:nvPr>
+            <p:ph type="title"/>
+          </p:nvPr>
+        </p:nvSpPr>
+        <p:spPr/>
+        <p:txBody>
+          <a:bodyPr/>
+          <a:lstStyle/>
+          <a:p>
+            <a:r>
+              <a:rPr lang="en-US" dirty="0"/>
+              <a:t>Classes: Interfaces</a:t>
+            </a:r>
+          </a:p>
+        </p:txBody>
+      </p:sp>
+      <p:sp>
+        <p:nvSpPr>
+          <p:cNvPr id="3" name="Content Placeholder 2">
+            <a:extLst>
+              <a:ext uri="{FF2B5EF4-FFF2-40B4-BE49-F238E27FC236}">
+                <a16:creationId xmlns:a16="http://schemas.microsoft.com/office/drawing/2014/main" id="{0C964076-BEAB-492A-86FC-DA9F6D09B506}"/>
+              </a:ext>
+            </a:extLst>
+          </p:cNvPr>
+          <p:cNvSpPr>
+            <a:spLocks noGrp="1"/>
+          </p:cNvSpPr>
+          <p:nvPr>
+            <p:ph idx="1"/>
+          </p:nvPr>
+        </p:nvSpPr>
+        <p:spPr>
+          <a:xfrm>
+            <a:off x="680322" y="2336873"/>
+            <a:ext cx="7211528" cy="3599316"/>
+          </a:xfrm>
+        </p:spPr>
+        <p:txBody>
+          <a:bodyPr>
+            <a:normAutofit fontScale="85000" lnSpcReduction="20000"/>
+          </a:bodyPr>
+          <a:lstStyle/>
+          <a:p>
+            <a:r>
+              <a:rPr lang="en-US" dirty="0"/>
+              <a:t>Interfaces vs inheritance</a:t>
+            </a:r>
+          </a:p>
+          <a:p>
+            <a:pPr lvl="1"/>
+            <a:r>
+              <a:rPr lang="en-US" dirty="0"/>
+              <a:t>“has a ” relationship vs “is a”</a:t>
+            </a:r>
+          </a:p>
+          <a:p>
+            <a:pPr lvl="1"/>
+            <a:r>
+              <a:rPr lang="en-US" dirty="0"/>
+              <a:t>For specifying the contract/</a:t>
+            </a:r>
+            <a:r>
+              <a:rPr lang="en-US" dirty="0" err="1"/>
+              <a:t>api</a:t>
+            </a:r>
+            <a:r>
+              <a:rPr lang="en-US" dirty="0"/>
+              <a:t>/interface</a:t>
+            </a:r>
+          </a:p>
+          <a:p>
+            <a:pPr lvl="1"/>
+            <a:r>
+              <a:rPr lang="en-US" dirty="0"/>
+              <a:t>You can only inherit from one class, but can use multiple interfaces.</a:t>
+            </a:r>
+          </a:p>
+          <a:p>
+            <a:pPr lvl="1"/>
+            <a:r>
+              <a:rPr lang="en-US" dirty="0"/>
+              <a:t>The class using an interface does not have access to any of the implementation details (variables, implementation of methods). You must override all methods provided by an interface</a:t>
+            </a:r>
+          </a:p>
+          <a:p>
+            <a:r>
+              <a:rPr lang="en-US" dirty="0"/>
+              <a:t>You can use both interfaces and inheritance:</a:t>
+            </a:r>
+          </a:p>
+          <a:p>
+            <a:pPr lvl="1"/>
+            <a:r>
+              <a:rPr lang="en-US" dirty="0"/>
+              <a:t>Class Subclass extends Superclass implements Interface</a:t>
+            </a:r>
+          </a:p>
+          <a:p>
+            <a:r>
+              <a:rPr lang="en-US" dirty="0"/>
+              <a:t>Interfaces in this context vs normal programming</a:t>
+            </a:r>
+          </a:p>
+          <a:p>
+            <a:r>
+              <a:rPr lang="en-US" dirty="0"/>
+              <a:t>Often used to add GUI, data retrieval methods to a class. Also for mocking during testing.</a:t>
+            </a:r>
+          </a:p>
+          <a:p>
+            <a:endParaRPr lang="en-US" dirty="0"/>
+          </a:p>
+        </p:txBody>
+      </p:sp>
+      <p:pic>
+        <p:nvPicPr>
+          <p:cNvPr id="5" name="Picture 4">
+            <a:extLst>
+              <a:ext uri="{FF2B5EF4-FFF2-40B4-BE49-F238E27FC236}">
+                <a16:creationId xmlns:a16="http://schemas.microsoft.com/office/drawing/2014/main" id="{7588BE32-F3B1-46FD-81BF-3BBC3CB0118F}"/>
+              </a:ext>
+            </a:extLst>
+          </p:cNvPr>
+          <p:cNvPicPr>
+            <a:picLocks noChangeAspect="1"/>
+          </p:cNvPicPr>
+          <p:nvPr/>
+        </p:nvPicPr>
+        <p:blipFill>
+          <a:blip r:embed="rId2"/>
+          <a:stretch>
+            <a:fillRect/>
+          </a:stretch>
+        </p:blipFill>
+        <p:spPr>
+          <a:xfrm>
+            <a:off x="7963429" y="0"/>
+            <a:ext cx="4228571" cy="5647619"/>
+          </a:xfrm>
+          <a:prstGeom prst="rect">
+            <a:avLst/>
+          </a:prstGeom>
+        </p:spPr>
+      </p:pic>
+    </p:spTree>
+    <p:extLst>
+      <p:ext uri="{BB962C8B-B14F-4D97-AF65-F5344CB8AC3E}">
+        <p14:creationId xmlns:p14="http://schemas.microsoft.com/office/powerpoint/2010/main" val="4164407216"/>
+      </p:ext>
+    </p:extLst>
+  </p:cSld>
+  <p:clrMapOvr>
+    <a:masterClrMapping/>
+  </p:clrMapOvr>
+</p:sld>
+</file>
+
+<file path=ppt/slides/slide12.xml><?xml version="1.0" encoding="utf-8"?>
+<p:sld xmlns:a="http://schemas.openxmlformats.org/drawingml/2006/main" xmlns:r="http://schemas.openxmlformats.org/officeDocument/2006/relationships" xmlns:p="http://schemas.openxmlformats.org/presentationml/2006/main">
+  <p:cSld>
+    <p:spTree>
+      <p:nvGrpSpPr>
+        <p:cNvPr id="1" name=""/>
+        <p:cNvGrpSpPr/>
+        <p:nvPr/>
+      </p:nvGrpSpPr>
+      <p:grpSpPr>
+        <a:xfrm>
+          <a:off x="0" y="0"/>
+          <a:ext cx="0" cy="0"/>
+          <a:chOff x="0" y="0"/>
+          <a:chExt cx="0" cy="0"/>
+        </a:xfrm>
+      </p:grpSpPr>
+      <p:sp>
+        <p:nvSpPr>
+          <p:cNvPr id="2" name="Title 1">
+            <a:extLst>
+              <a:ext uri="{FF2B5EF4-FFF2-40B4-BE49-F238E27FC236}">
+                <a16:creationId xmlns:a16="http://schemas.microsoft.com/office/drawing/2014/main" id="{E11D6A52-0C19-426A-A2CE-4D7C0A1281B3}"/>
+              </a:ext>
+            </a:extLst>
+          </p:cNvPr>
+          <p:cNvSpPr>
+            <a:spLocks noGrp="1"/>
+          </p:cNvSpPr>
+          <p:nvPr>
+            <p:ph type="title"/>
+          </p:nvPr>
+        </p:nvSpPr>
+        <p:spPr/>
+        <p:txBody>
+          <a:bodyPr/>
+          <a:lstStyle/>
+          <a:p>
+            <a:r>
+              <a:rPr lang="en-US" dirty="0"/>
+              <a:t>Classes: </a:t>
+            </a:r>
+            <a:r>
+              <a:rPr lang="en-US" dirty="0" err="1"/>
+              <a:t>Mixins</a:t>
+            </a:r>
+            <a:endParaRPr lang="en-US" dirty="0"/>
+          </a:p>
+        </p:txBody>
+      </p:sp>
+      <p:sp>
+        <p:nvSpPr>
+          <p:cNvPr id="3" name="Content Placeholder 2">
+            <a:extLst>
+              <a:ext uri="{FF2B5EF4-FFF2-40B4-BE49-F238E27FC236}">
+                <a16:creationId xmlns:a16="http://schemas.microsoft.com/office/drawing/2014/main" id="{73A1B8D3-E5A0-4C24-8C22-F41E008FBB4C}"/>
+              </a:ext>
+            </a:extLst>
+          </p:cNvPr>
+          <p:cNvSpPr>
+            <a:spLocks noGrp="1"/>
+          </p:cNvSpPr>
+          <p:nvPr>
+            <p:ph idx="1"/>
+          </p:nvPr>
+        </p:nvSpPr>
+        <p:spPr>
+          <a:xfrm>
+            <a:off x="680321" y="2336873"/>
+            <a:ext cx="6435489" cy="3599316"/>
+          </a:xfrm>
+        </p:spPr>
+        <p:txBody>
+          <a:bodyPr/>
+          <a:lstStyle/>
+          <a:p>
+            <a:r>
+              <a:rPr lang="en-US" dirty="0"/>
+              <a:t>Difference between </a:t>
+            </a:r>
+            <a:r>
+              <a:rPr lang="en-US" dirty="0" err="1"/>
+              <a:t>mixins</a:t>
+            </a:r>
+            <a:r>
+              <a:rPr lang="en-US" dirty="0"/>
+              <a:t> and interfaces</a:t>
+            </a:r>
+          </a:p>
+          <a:p>
+            <a:pPr lvl="1"/>
+            <a:r>
+              <a:rPr lang="en-US" dirty="0"/>
+              <a:t>No need to overwrite </a:t>
+            </a:r>
+            <a:r>
+              <a:rPr lang="en-US" dirty="0" err="1"/>
+              <a:t>mixin</a:t>
+            </a:r>
+            <a:r>
+              <a:rPr lang="en-US" dirty="0"/>
+              <a:t> methods</a:t>
+            </a:r>
+          </a:p>
+          <a:p>
+            <a:pPr lvl="1"/>
+            <a:r>
+              <a:rPr lang="en-US" dirty="0" err="1"/>
+              <a:t>Mixins</a:t>
+            </a:r>
+            <a:r>
+              <a:rPr lang="en-US" dirty="0"/>
+              <a:t> are for sharing implementations and code reuse, while interfaces are for specifying the contract/</a:t>
+            </a:r>
+            <a:r>
+              <a:rPr lang="en-US" dirty="0" err="1"/>
+              <a:t>api</a:t>
+            </a:r>
+            <a:endParaRPr lang="en-US" dirty="0"/>
+          </a:p>
+          <a:p>
+            <a:pPr lvl="1"/>
+            <a:endParaRPr lang="en-US" dirty="0"/>
+          </a:p>
+          <a:p>
+            <a:pPr lvl="1"/>
+            <a:endParaRPr lang="en-US" dirty="0"/>
+          </a:p>
+        </p:txBody>
+      </p:sp>
+      <p:pic>
+        <p:nvPicPr>
+          <p:cNvPr id="11" name="Picture 10">
+            <a:extLst>
+              <a:ext uri="{FF2B5EF4-FFF2-40B4-BE49-F238E27FC236}">
+                <a16:creationId xmlns:a16="http://schemas.microsoft.com/office/drawing/2014/main" id="{A67B5FF4-7451-47E7-AFAC-A1297C69FB8A}"/>
+              </a:ext>
+            </a:extLst>
+          </p:cNvPr>
+          <p:cNvPicPr>
+            <a:picLocks noChangeAspect="1"/>
+          </p:cNvPicPr>
+          <p:nvPr/>
+        </p:nvPicPr>
+        <p:blipFill>
+          <a:blip r:embed="rId2"/>
+          <a:stretch>
+            <a:fillRect/>
+          </a:stretch>
+        </p:blipFill>
+        <p:spPr>
+          <a:xfrm>
+            <a:off x="7039619" y="0"/>
+            <a:ext cx="5152381" cy="4800000"/>
+          </a:xfrm>
+          <a:prstGeom prst="rect">
+            <a:avLst/>
+          </a:prstGeom>
+        </p:spPr>
+      </p:pic>
+      <p:pic>
+        <p:nvPicPr>
+          <p:cNvPr id="13" name="Picture 12">
+            <a:extLst>
+              <a:ext uri="{FF2B5EF4-FFF2-40B4-BE49-F238E27FC236}">
+                <a16:creationId xmlns:a16="http://schemas.microsoft.com/office/drawing/2014/main" id="{72FA285D-3C86-47F9-B6B7-F478E7C72229}"/>
+              </a:ext>
+            </a:extLst>
+          </p:cNvPr>
+          <p:cNvPicPr>
+            <a:picLocks noChangeAspect="1"/>
+          </p:cNvPicPr>
+          <p:nvPr/>
+        </p:nvPicPr>
+        <p:blipFill>
+          <a:blip r:embed="rId3"/>
+          <a:stretch>
+            <a:fillRect/>
+          </a:stretch>
+        </p:blipFill>
+        <p:spPr>
+          <a:xfrm>
+            <a:off x="7039619" y="4930535"/>
+            <a:ext cx="4238095" cy="1352381"/>
+          </a:xfrm>
+          <a:prstGeom prst="rect">
+            <a:avLst/>
+          </a:prstGeom>
+        </p:spPr>
+      </p:pic>
+    </p:spTree>
+    <p:extLst>
+      <p:ext uri="{BB962C8B-B14F-4D97-AF65-F5344CB8AC3E}">
+        <p14:creationId xmlns:p14="http://schemas.microsoft.com/office/powerpoint/2010/main" val="2272071776"/>
+      </p:ext>
+    </p:extLst>
+  </p:cSld>
+  <p:clrMapOvr>
+    <a:masterClrMapping/>
+  </p:clrMapOvr>
+</p:sld>
+</file>
+
+<file path=ppt/slides/slide13.xml><?xml version="1.0" encoding="utf-8"?>
+<p:sld xmlns:a="http://schemas.openxmlformats.org/drawingml/2006/main" xmlns:r="http://schemas.openxmlformats.org/officeDocument/2006/relationships" xmlns:p="http://schemas.openxmlformats.org/presentationml/2006/main">
+  <p:cSld>
+    <p:spTree>
+      <p:nvGrpSpPr>
+        <p:cNvPr id="1" name=""/>
+        <p:cNvGrpSpPr/>
+        <p:nvPr/>
+      </p:nvGrpSpPr>
+      <p:grpSpPr>
+        <a:xfrm>
+          <a:off x="0" y="0"/>
+          <a:ext cx="0" cy="0"/>
+          <a:chOff x="0" y="0"/>
+          <a:chExt cx="0" cy="0"/>
+        </a:xfrm>
+      </p:grpSpPr>
+      <p:sp>
+        <p:nvSpPr>
+          <p:cNvPr id="2" name="Title 1">
+            <a:extLst>
+              <a:ext uri="{FF2B5EF4-FFF2-40B4-BE49-F238E27FC236}">
+                <a16:creationId xmlns:a16="http://schemas.microsoft.com/office/drawing/2014/main" id="{DB07C347-A311-4A6F-83F8-D06A937BD60F}"/>
+              </a:ext>
+            </a:extLst>
+          </p:cNvPr>
+          <p:cNvSpPr>
+            <a:spLocks noGrp="1"/>
+          </p:cNvSpPr>
+          <p:nvPr>
+            <p:ph type="title"/>
+          </p:nvPr>
+        </p:nvSpPr>
+        <p:spPr/>
+        <p:txBody>
+          <a:bodyPr/>
+          <a:lstStyle/>
+          <a:p>
+            <a:r>
+              <a:rPr lang="en-US" dirty="0"/>
+              <a:t>Classes: extensions</a:t>
+            </a:r>
+          </a:p>
+        </p:txBody>
+      </p:sp>
+      <p:sp>
+        <p:nvSpPr>
+          <p:cNvPr id="3" name="Content Placeholder 2">
+            <a:extLst>
+              <a:ext uri="{FF2B5EF4-FFF2-40B4-BE49-F238E27FC236}">
+                <a16:creationId xmlns:a16="http://schemas.microsoft.com/office/drawing/2014/main" id="{3571A3DC-F9B2-44B6-B614-2BC64C102E90}"/>
+              </a:ext>
+            </a:extLst>
+          </p:cNvPr>
+          <p:cNvSpPr>
+            <a:spLocks noGrp="1"/>
+          </p:cNvSpPr>
+          <p:nvPr>
+            <p:ph idx="1"/>
+          </p:nvPr>
+        </p:nvSpPr>
+        <p:spPr>
+          <a:xfrm>
+            <a:off x="680321" y="2336873"/>
+            <a:ext cx="7553149" cy="3599316"/>
+          </a:xfrm>
+        </p:spPr>
+        <p:txBody>
+          <a:bodyPr/>
+          <a:lstStyle/>
+          <a:p>
+            <a:r>
+              <a:rPr lang="en-US" dirty="0"/>
+              <a:t>For adding new functionality to existing classes without creating new classes</a:t>
+            </a:r>
+          </a:p>
+          <a:p>
+            <a:r>
+              <a:rPr lang="en-US" dirty="0"/>
+              <a:t>Without them, you create wrappers around them</a:t>
+            </a:r>
+          </a:p>
+          <a:p>
+            <a:r>
+              <a:rPr lang="en-US" dirty="0"/>
+              <a:t>Used for classes from libraries, classes you did not create yourself.</a:t>
+            </a:r>
+          </a:p>
+        </p:txBody>
+      </p:sp>
+      <p:pic>
+        <p:nvPicPr>
+          <p:cNvPr id="7" name="Picture 6">
+            <a:extLst>
+              <a:ext uri="{FF2B5EF4-FFF2-40B4-BE49-F238E27FC236}">
+                <a16:creationId xmlns:a16="http://schemas.microsoft.com/office/drawing/2014/main" id="{966308EA-EF94-4A9F-A56B-02AD9607703E}"/>
+              </a:ext>
+            </a:extLst>
+          </p:cNvPr>
+          <p:cNvPicPr>
+            <a:picLocks noChangeAspect="1"/>
+          </p:cNvPicPr>
+          <p:nvPr/>
+        </p:nvPicPr>
+        <p:blipFill>
+          <a:blip r:embed="rId2"/>
+          <a:stretch>
+            <a:fillRect/>
+          </a:stretch>
+        </p:blipFill>
+        <p:spPr>
+          <a:xfrm>
+            <a:off x="8233470" y="4136531"/>
+            <a:ext cx="1866667" cy="1000000"/>
+          </a:xfrm>
+          <a:prstGeom prst="rect">
+            <a:avLst/>
+          </a:prstGeom>
+        </p:spPr>
+      </p:pic>
+      <p:pic>
+        <p:nvPicPr>
+          <p:cNvPr id="11" name="Picture 10">
+            <a:extLst>
+              <a:ext uri="{FF2B5EF4-FFF2-40B4-BE49-F238E27FC236}">
+                <a16:creationId xmlns:a16="http://schemas.microsoft.com/office/drawing/2014/main" id="{22427F39-3BA1-42CF-98F0-74B7CC160E88}"/>
+              </a:ext>
+            </a:extLst>
+          </p:cNvPr>
+          <p:cNvPicPr>
+            <a:picLocks noChangeAspect="1"/>
+          </p:cNvPicPr>
+          <p:nvPr/>
+        </p:nvPicPr>
+        <p:blipFill>
+          <a:blip r:embed="rId3"/>
+          <a:stretch>
+            <a:fillRect/>
+          </a:stretch>
+        </p:blipFill>
+        <p:spPr>
+          <a:xfrm>
+            <a:off x="8161137" y="1953802"/>
+            <a:ext cx="2295238" cy="1971429"/>
+          </a:xfrm>
+          <a:prstGeom prst="rect">
+            <a:avLst/>
+          </a:prstGeom>
+        </p:spPr>
+      </p:pic>
+    </p:spTree>
+    <p:extLst>
+      <p:ext uri="{BB962C8B-B14F-4D97-AF65-F5344CB8AC3E}">
+        <p14:creationId xmlns:p14="http://schemas.microsoft.com/office/powerpoint/2010/main" val="436435605"/>
+      </p:ext>
+    </p:extLst>
+  </p:cSld>
+  <p:clrMapOvr>
+    <a:masterClrMapping/>
+  </p:clrMapOvr>
+</p:sld>
+</file>
+
+<file path=ppt/slides/slide14.xml><?xml version="1.0" encoding="utf-8"?>
+<p:sld xmlns:a="http://schemas.openxmlformats.org/drawingml/2006/main" xmlns:r="http://schemas.openxmlformats.org/officeDocument/2006/relationships" xmlns:p="http://schemas.openxmlformats.org/presentationml/2006/main">
+  <p:cSld>
+    <p:spTree>
+      <p:nvGrpSpPr>
+        <p:cNvPr id="1" name=""/>
+        <p:cNvGrpSpPr/>
+        <p:nvPr/>
+      </p:nvGrpSpPr>
+      <p:grpSpPr>
+        <a:xfrm>
+          <a:off x="0" y="0"/>
+          <a:ext cx="0" cy="0"/>
+          <a:chOff x="0" y="0"/>
+          <a:chExt cx="0" cy="0"/>
+        </a:xfrm>
+      </p:grpSpPr>
+      <p:sp>
+        <p:nvSpPr>
+          <p:cNvPr id="2" name="Title 1">
+            <a:extLst>
+              <a:ext uri="{FF2B5EF4-FFF2-40B4-BE49-F238E27FC236}">
+                <a16:creationId xmlns:a16="http://schemas.microsoft.com/office/drawing/2014/main" id="{6EA7066A-8E37-41BD-B577-3ABD728B0EAE}"/>
+              </a:ext>
+            </a:extLst>
+          </p:cNvPr>
+          <p:cNvSpPr>
+            <a:spLocks noGrp="1"/>
+          </p:cNvSpPr>
+          <p:nvPr>
+            <p:ph type="title"/>
+          </p:nvPr>
+        </p:nvSpPr>
+        <p:spPr/>
+        <p:txBody>
+          <a:bodyPr/>
+          <a:lstStyle/>
+          <a:p>
+            <a:r>
+              <a:rPr lang="en-US" dirty="0"/>
+              <a:t>comparison</a:t>
+            </a:r>
+          </a:p>
+        </p:txBody>
+      </p:sp>
+      <p:graphicFrame>
+        <p:nvGraphicFramePr>
+          <p:cNvPr id="4" name="Table 4">
+            <a:extLst>
+              <a:ext uri="{FF2B5EF4-FFF2-40B4-BE49-F238E27FC236}">
+                <a16:creationId xmlns:a16="http://schemas.microsoft.com/office/drawing/2014/main" id="{10912FDA-C28A-4045-BAD6-7EEE07D3CAFF}"/>
+              </a:ext>
+            </a:extLst>
+          </p:cNvPr>
+          <p:cNvGraphicFramePr>
+            <a:graphicFrameLocks noGrp="1"/>
+          </p:cNvGraphicFramePr>
+          <p:nvPr>
+            <p:ph idx="1"/>
+            <p:extLst>
+              <p:ext uri="{D42A27DB-BD31-4B8C-83A1-F6EECF244321}">
+                <p14:modId xmlns:p14="http://schemas.microsoft.com/office/powerpoint/2010/main" val="3133657211"/>
+              </p:ext>
+            </p:extLst>
+          </p:nvPr>
+        </p:nvGraphicFramePr>
+        <p:xfrm>
+          <a:off x="277383" y="2377989"/>
+          <a:ext cx="11247351" cy="2392680"/>
+        </p:xfrm>
+        <a:graphic>
+          <a:graphicData uri="http://schemas.openxmlformats.org/drawingml/2006/table">
+            <a:tbl>
+              <a:tblPr firstRow="1" bandRow="1">
+                <a:tableStyleId>{5C22544A-7EE6-4342-B048-85BDC9FD1C3A}</a:tableStyleId>
+              </a:tblPr>
+              <a:tblGrid>
+                <a:gridCol w="2565611">
+                  <a:extLst>
+                    <a:ext uri="{9D8B030D-6E8A-4147-A177-3AD203B41FA5}">
+                      <a16:colId xmlns:a16="http://schemas.microsoft.com/office/drawing/2014/main" val="3918074362"/>
+                    </a:ext>
+                  </a:extLst>
+                </a:gridCol>
+                <a:gridCol w="1664520">
+                  <a:extLst>
+                    <a:ext uri="{9D8B030D-6E8A-4147-A177-3AD203B41FA5}">
+                      <a16:colId xmlns:a16="http://schemas.microsoft.com/office/drawing/2014/main" val="1489407890"/>
+                    </a:ext>
+                  </a:extLst>
+                </a:gridCol>
+                <a:gridCol w="2747972">
+                  <a:extLst>
+                    <a:ext uri="{9D8B030D-6E8A-4147-A177-3AD203B41FA5}">
+                      <a16:colId xmlns:a16="http://schemas.microsoft.com/office/drawing/2014/main" val="2683342374"/>
+                    </a:ext>
+                  </a:extLst>
+                </a:gridCol>
+                <a:gridCol w="4269248">
+                  <a:extLst>
+                    <a:ext uri="{9D8B030D-6E8A-4147-A177-3AD203B41FA5}">
+                      <a16:colId xmlns:a16="http://schemas.microsoft.com/office/drawing/2014/main" val="963476417"/>
+                    </a:ext>
+                  </a:extLst>
+                </a:gridCol>
+              </a:tblGrid>
+              <a:tr h="370840">
+                <a:tc>
+                  <a:txBody>
+                    <a:bodyPr/>
+                    <a:lstStyle/>
+                    <a:p>
+                      <a:endParaRPr lang="en-US" dirty="0"/>
+                    </a:p>
+                  </a:txBody>
+                  <a:tcPr/>
+                </a:tc>
+                <a:tc>
+                  <a:txBody>
+                    <a:bodyPr/>
+                    <a:lstStyle/>
+                    <a:p>
+                      <a:r>
+                        <a:rPr lang="en-US" dirty="0"/>
+                        <a:t>multiple</a:t>
+                      </a:r>
+                    </a:p>
+                  </a:txBody>
+                  <a:tcPr/>
+                </a:tc>
+                <a:tc>
+                  <a:txBody>
+                    <a:bodyPr/>
+                    <a:lstStyle/>
+                    <a:p>
+                      <a:r>
+                        <a:rPr lang="en-US" dirty="0"/>
+                        <a:t>need to overwrite</a:t>
+                      </a:r>
+                    </a:p>
+                  </a:txBody>
+                  <a:tcPr/>
+                </a:tc>
+                <a:tc>
+                  <a:txBody>
+                    <a:bodyPr/>
+                    <a:lstStyle/>
+                    <a:p>
+                      <a:r>
+                        <a:rPr lang="en-US" dirty="0"/>
+                        <a:t>Purpose</a:t>
+                      </a:r>
+                    </a:p>
+                  </a:txBody>
+                  <a:tcPr/>
+                </a:tc>
+                <a:extLst>
+                  <a:ext uri="{0D108BD9-81ED-4DB2-BD59-A6C34878D82A}">
+                    <a16:rowId xmlns:a16="http://schemas.microsoft.com/office/drawing/2014/main" val="172400523"/>
+                  </a:ext>
+                </a:extLst>
+              </a:tr>
+              <a:tr h="370840">
+                <a:tc>
+                  <a:txBody>
+                    <a:bodyPr/>
+                    <a:lstStyle/>
+                    <a:p>
+                      <a:r>
+                        <a:rPr lang="en-US" dirty="0"/>
+                        <a:t>Inheritance</a:t>
+                      </a:r>
+                    </a:p>
+                  </a:txBody>
+                  <a:tcPr/>
+                </a:tc>
+                <a:tc>
+                  <a:txBody>
+                    <a:bodyPr/>
+                    <a:lstStyle/>
+                    <a:p>
+                      <a:r>
+                        <a:rPr lang="en-US" dirty="0"/>
+                        <a:t>No</a:t>
+                      </a:r>
+                    </a:p>
+                  </a:txBody>
+                  <a:tcPr/>
+                </a:tc>
+                <a:tc>
+                  <a:txBody>
+                    <a:bodyPr/>
+                    <a:lstStyle/>
+                    <a:p>
+                      <a:r>
+                        <a:rPr lang="en-US" dirty="0"/>
+                        <a:t>No, only when desired</a:t>
+                      </a:r>
+                    </a:p>
+                  </a:txBody>
+                  <a:tcPr/>
+                </a:tc>
+                <a:tc>
+                  <a:txBody>
+                    <a:bodyPr/>
+                    <a:lstStyle/>
+                    <a:p>
+                      <a:r>
+                        <a:rPr lang="en-US" dirty="0"/>
+                        <a:t>Contract specification, abstraction, DRY</a:t>
+                      </a:r>
+                    </a:p>
+                  </a:txBody>
+                  <a:tcPr/>
+                </a:tc>
+                <a:extLst>
+                  <a:ext uri="{0D108BD9-81ED-4DB2-BD59-A6C34878D82A}">
+                    <a16:rowId xmlns:a16="http://schemas.microsoft.com/office/drawing/2014/main" val="2894576607"/>
+                  </a:ext>
+                </a:extLst>
+              </a:tr>
+              <a:tr h="370840">
+                <a:tc>
+                  <a:txBody>
+                    <a:bodyPr/>
+                    <a:lstStyle/>
+                    <a:p>
+                      <a:r>
+                        <a:rPr lang="en-US" dirty="0"/>
+                        <a:t>Interface</a:t>
+                      </a:r>
+                    </a:p>
+                  </a:txBody>
+                  <a:tcPr/>
+                </a:tc>
+                <a:tc>
+                  <a:txBody>
+                    <a:bodyPr/>
+                    <a:lstStyle/>
+                    <a:p>
+                      <a:r>
+                        <a:rPr lang="en-US" dirty="0"/>
+                        <a:t>Yes</a:t>
+                      </a:r>
+                    </a:p>
+                  </a:txBody>
+                  <a:tcPr/>
+                </a:tc>
+                <a:tc>
+                  <a:txBody>
+                    <a:bodyPr/>
+                    <a:lstStyle/>
+                    <a:p>
+                      <a:r>
+                        <a:rPr lang="en-US" dirty="0"/>
+                        <a:t>Yes</a:t>
+                      </a:r>
+                    </a:p>
+                  </a:txBody>
+                  <a:tcPr/>
+                </a:tc>
+                <a:tc>
+                  <a:txBody>
+                    <a:bodyPr/>
+                    <a:lstStyle/>
+                    <a:p>
+                      <a:r>
+                        <a:rPr lang="en-US" dirty="0"/>
+                        <a:t>Specifying the contract/interface</a:t>
+                      </a:r>
+                    </a:p>
+                  </a:txBody>
+                  <a:tcPr/>
+                </a:tc>
+                <a:extLst>
+                  <a:ext uri="{0D108BD9-81ED-4DB2-BD59-A6C34878D82A}">
+                    <a16:rowId xmlns:a16="http://schemas.microsoft.com/office/drawing/2014/main" val="845528135"/>
+                  </a:ext>
+                </a:extLst>
+              </a:tr>
+              <a:tr h="370840">
+                <a:tc>
+                  <a:txBody>
+                    <a:bodyPr/>
+                    <a:lstStyle/>
+                    <a:p>
+                      <a:r>
+                        <a:rPr lang="en-US" dirty="0" err="1"/>
+                        <a:t>Mixin</a:t>
+                      </a:r>
+                      <a:endParaRPr lang="en-US" dirty="0"/>
+                    </a:p>
+                  </a:txBody>
+                  <a:tcPr/>
+                </a:tc>
+                <a:tc>
+                  <a:txBody>
+                    <a:bodyPr/>
+                    <a:lstStyle/>
+                    <a:p>
+                      <a:r>
+                        <a:rPr lang="en-US" dirty="0"/>
+                        <a:t>Yes</a:t>
+                      </a:r>
+                    </a:p>
+                  </a:txBody>
+                  <a:tcPr/>
+                </a:tc>
+                <a:tc>
+                  <a:txBody>
+                    <a:bodyPr/>
+                    <a:lstStyle/>
+                    <a:p>
+                      <a:r>
+                        <a:rPr lang="en-US" dirty="0"/>
+                        <a:t>No, only when desired</a:t>
+                      </a:r>
+                    </a:p>
+                  </a:txBody>
+                  <a:tcPr/>
+                </a:tc>
+                <a:tc>
+                  <a:txBody>
+                    <a:bodyPr/>
+                    <a:lstStyle/>
+                    <a:p>
+                      <a:r>
+                        <a:rPr lang="en-US" dirty="0"/>
+                        <a:t>DRY</a:t>
+                      </a:r>
+                    </a:p>
+                  </a:txBody>
+                  <a:tcPr/>
+                </a:tc>
+                <a:extLst>
+                  <a:ext uri="{0D108BD9-81ED-4DB2-BD59-A6C34878D82A}">
+                    <a16:rowId xmlns:a16="http://schemas.microsoft.com/office/drawing/2014/main" val="590097616"/>
+                  </a:ext>
+                </a:extLst>
+              </a:tr>
+              <a:tr h="370840">
+                <a:tc>
+                  <a:txBody>
+                    <a:bodyPr/>
+                    <a:lstStyle/>
+                    <a:p>
+                      <a:r>
+                        <a:rPr lang="en-US" dirty="0"/>
+                        <a:t>extension</a:t>
+                      </a:r>
+                    </a:p>
+                  </a:txBody>
+                  <a:tcPr/>
+                </a:tc>
+                <a:tc>
+                  <a:txBody>
+                    <a:bodyPr/>
+                    <a:lstStyle/>
+                    <a:p>
+                      <a:r>
+                        <a:rPr lang="en-US" dirty="0"/>
+                        <a:t>Yes, but don’t</a:t>
+                      </a:r>
+                    </a:p>
+                  </a:txBody>
+                  <a:tcPr/>
+                </a:tc>
+                <a:tc>
+                  <a:txBody>
+                    <a:bodyPr/>
+                    <a:lstStyle/>
+                    <a:p>
+                      <a:r>
+                        <a:rPr lang="en-US" dirty="0"/>
+                        <a:t>No. You can, but don’t</a:t>
+                      </a:r>
+                    </a:p>
+                  </a:txBody>
+                  <a:tcPr/>
+                </a:tc>
+                <a:tc>
+                  <a:txBody>
+                    <a:bodyPr/>
+                    <a:lstStyle/>
+                    <a:p>
+                      <a:r>
+                        <a:rPr lang="en-US" dirty="0" err="1"/>
+                        <a:t>Addding</a:t>
+                      </a:r>
+                      <a:r>
+                        <a:rPr lang="en-US" dirty="0"/>
+                        <a:t> functionality without creating new classes</a:t>
+                      </a:r>
+                    </a:p>
+                  </a:txBody>
+                  <a:tcPr/>
+                </a:tc>
+                <a:extLst>
+                  <a:ext uri="{0D108BD9-81ED-4DB2-BD59-A6C34878D82A}">
+                    <a16:rowId xmlns:a16="http://schemas.microsoft.com/office/drawing/2014/main" val="2884389925"/>
+                  </a:ext>
+                </a:extLst>
+              </a:tr>
+            </a:tbl>
+          </a:graphicData>
+        </a:graphic>
+      </p:graphicFrame>
+    </p:spTree>
+    <p:extLst>
+      <p:ext uri="{BB962C8B-B14F-4D97-AF65-F5344CB8AC3E}">
+        <p14:creationId xmlns:p14="http://schemas.microsoft.com/office/powerpoint/2010/main" val="1372445352"/>
       </p:ext>
     </p:extLst>
   </p:cSld>
@@ -15629,7 +16742,12 @@
             <p:ph type="title"/>
           </p:nvPr>
         </p:nvSpPr>
-        <p:spPr/>
+        <p:spPr>
+          <a:xfrm>
+            <a:off x="700216" y="753228"/>
+            <a:ext cx="9593966" cy="1080938"/>
+          </a:xfrm>
+        </p:spPr>
         <p:txBody>
           <a:bodyPr/>
           <a:lstStyle/>
@@ -16657,6 +17775,150 @@
     <p:extLst>
       <p:ext uri="{BB962C8B-B14F-4D97-AF65-F5344CB8AC3E}">
         <p14:creationId xmlns:p14="http://schemas.microsoft.com/office/powerpoint/2010/main" val="177298313"/>
+      </p:ext>
+    </p:extLst>
+  </p:cSld>
+  <p:clrMapOvr>
+    <a:masterClrMapping/>
+  </p:clrMapOvr>
+</p:sld>
+</file>
+
+<file path=ppt/slides/slide9.xml><?xml version="1.0" encoding="utf-8"?>
+<p:sld xmlns:a="http://schemas.openxmlformats.org/drawingml/2006/main" xmlns:r="http://schemas.openxmlformats.org/officeDocument/2006/relationships" xmlns:p="http://schemas.openxmlformats.org/presentationml/2006/main">
+  <p:cSld>
+    <p:spTree>
+      <p:nvGrpSpPr>
+        <p:cNvPr id="1" name=""/>
+        <p:cNvGrpSpPr/>
+        <p:nvPr/>
+      </p:nvGrpSpPr>
+      <p:grpSpPr>
+        <a:xfrm>
+          <a:off x="0" y="0"/>
+          <a:ext cx="0" cy="0"/>
+          <a:chOff x="0" y="0"/>
+          <a:chExt cx="0" cy="0"/>
+        </a:xfrm>
+      </p:grpSpPr>
+      <p:sp>
+        <p:nvSpPr>
+          <p:cNvPr id="2" name="Title 1">
+            <a:extLst>
+              <a:ext uri="{FF2B5EF4-FFF2-40B4-BE49-F238E27FC236}">
+                <a16:creationId xmlns:a16="http://schemas.microsoft.com/office/drawing/2014/main" id="{C9A60866-D6E4-425F-BEF4-F2809639BD8B}"/>
+              </a:ext>
+            </a:extLst>
+          </p:cNvPr>
+          <p:cNvSpPr>
+            <a:spLocks noGrp="1"/>
+          </p:cNvSpPr>
+          <p:nvPr>
+            <p:ph type="title"/>
+          </p:nvPr>
+        </p:nvSpPr>
+        <p:spPr/>
+        <p:txBody>
+          <a:bodyPr/>
+          <a:lstStyle/>
+          <a:p>
+            <a:r>
+              <a:rPr lang="en-US" dirty="0"/>
+              <a:t>Classes: Inheritance</a:t>
+            </a:r>
+          </a:p>
+        </p:txBody>
+      </p:sp>
+      <p:sp>
+        <p:nvSpPr>
+          <p:cNvPr id="3" name="Content Placeholder 2">
+            <a:extLst>
+              <a:ext uri="{FF2B5EF4-FFF2-40B4-BE49-F238E27FC236}">
+                <a16:creationId xmlns:a16="http://schemas.microsoft.com/office/drawing/2014/main" id="{F9903D3E-20BE-470C-8649-1047B8C5905C}"/>
+              </a:ext>
+            </a:extLst>
+          </p:cNvPr>
+          <p:cNvSpPr>
+            <a:spLocks noGrp="1"/>
+          </p:cNvSpPr>
+          <p:nvPr>
+            <p:ph idx="1"/>
+          </p:nvPr>
+        </p:nvSpPr>
+        <p:spPr/>
+        <p:txBody>
+          <a:bodyPr/>
+          <a:lstStyle/>
+          <a:p>
+            <a:r>
+              <a:rPr lang="en-US" dirty="0"/>
+              <a:t>Inheritance</a:t>
+            </a:r>
+          </a:p>
+          <a:p>
+            <a:r>
+              <a:rPr lang="en-US" dirty="0"/>
+              <a:t>Override</a:t>
+            </a:r>
+          </a:p>
+          <a:p>
+            <a:r>
+              <a:rPr lang="en-US" dirty="0" err="1"/>
+              <a:t>Superclasses</a:t>
+            </a:r>
+            <a:r>
+              <a:rPr lang="en-US" dirty="0"/>
+              <a:t> and subclasses</a:t>
+            </a:r>
+          </a:p>
+          <a:p>
+            <a:r>
+              <a:rPr lang="en-US" dirty="0"/>
+              <a:t>Super()</a:t>
+            </a:r>
+          </a:p>
+          <a:p>
+            <a:r>
+              <a:rPr lang="en-US" dirty="0"/>
+              <a:t>Abstract classes</a:t>
+            </a:r>
+          </a:p>
+        </p:txBody>
+      </p:sp>
+      <p:pic>
+        <p:nvPicPr>
+          <p:cNvPr id="7" name="Picture 6">
+            <a:extLst>
+              <a:ext uri="{FF2B5EF4-FFF2-40B4-BE49-F238E27FC236}">
+                <a16:creationId xmlns:a16="http://schemas.microsoft.com/office/drawing/2014/main" id="{FA711996-CAB2-4D77-BBA5-A2BA68BA11FD}"/>
+              </a:ext>
+            </a:extLst>
+          </p:cNvPr>
+          <p:cNvPicPr>
+            <a:picLocks noChangeAspect="1"/>
+          </p:cNvPicPr>
+          <p:nvPr/>
+        </p:nvPicPr>
+        <p:blipFill>
+          <a:blip r:embed="rId2"/>
+          <a:stretch>
+            <a:fillRect/>
+          </a:stretch>
+        </p:blipFill>
+        <p:spPr>
+          <a:xfrm>
+            <a:off x="6353905" y="2058000"/>
+            <a:ext cx="5838095" cy="4800000"/>
+          </a:xfrm>
+          <a:prstGeom prst="rect">
+            <a:avLst/>
+          </a:prstGeom>
+        </p:spPr>
+      </p:pic>
+    </p:spTree>
+    <p:extLst>
+      <p:ext uri="{BB962C8B-B14F-4D97-AF65-F5344CB8AC3E}">
+        <p14:creationId xmlns:p14="http://schemas.microsoft.com/office/powerpoint/2010/main" val="1117417568"/>
       </p:ext>
     </p:extLst>
   </p:cSld>

</xml_diff>

<commit_message>
changed error in pptx
</commit_message>
<xml_diff>
--- a/week3/week3_slideshow.pptx
+++ b/week3/week3_slideshow.pptx
@@ -214,7 +214,7 @@
           <a:p>
             <a:fld id="{22359FA8-0645-430F-BE3A-18977B50E42F}" type="datetimeFigureOut">
               <a:rPr lang="en-US" smtClean="0"/>
-              <a:t>2/18/2022</a:t>
+              <a:t>2/19/2022</a:t>
             </a:fld>
             <a:endParaRPr lang="en-US"/>
           </a:p>
@@ -1058,7 +1058,7 @@
           <a:p>
             <a:fld id="{34891F7B-7391-4F87-9AA4-1E9AC2164F40}" type="datetimeFigureOut">
               <a:rPr lang="en-US" smtClean="0"/>
-              <a:t>2/18/2022</a:t>
+              <a:t>2/19/2022</a:t>
             </a:fld>
             <a:endParaRPr lang="en-US"/>
           </a:p>
@@ -1472,7 +1472,7 @@
           <a:p>
             <a:fld id="{34891F7B-7391-4F87-9AA4-1E9AC2164F40}" type="datetimeFigureOut">
               <a:rPr lang="en-US" smtClean="0"/>
-              <a:t>2/18/2022</a:t>
+              <a:t>2/19/2022</a:t>
             </a:fld>
             <a:endParaRPr lang="en-US"/>
           </a:p>
@@ -1808,7 +1808,7 @@
           <a:p>
             <a:fld id="{34891F7B-7391-4F87-9AA4-1E9AC2164F40}" type="datetimeFigureOut">
               <a:rPr lang="en-US" smtClean="0"/>
-              <a:t>2/18/2022</a:t>
+              <a:t>2/19/2022</a:t>
             </a:fld>
             <a:endParaRPr lang="en-US"/>
           </a:p>
@@ -2213,7 +2213,7 @@
           <a:p>
             <a:fld id="{34891F7B-7391-4F87-9AA4-1E9AC2164F40}" type="datetimeFigureOut">
               <a:rPr lang="en-US" smtClean="0"/>
-              <a:t>2/18/2022</a:t>
+              <a:t>2/19/2022</a:t>
             </a:fld>
             <a:endParaRPr lang="en-US"/>
           </a:p>
@@ -2781,7 +2781,7 @@
           <a:p>
             <a:fld id="{34891F7B-7391-4F87-9AA4-1E9AC2164F40}" type="datetimeFigureOut">
               <a:rPr lang="en-US" smtClean="0"/>
-              <a:t>2/18/2022</a:t>
+              <a:t>2/19/2022</a:t>
             </a:fld>
             <a:endParaRPr lang="en-US"/>
           </a:p>
@@ -3462,7 +3462,7 @@
           <a:p>
             <a:fld id="{34891F7B-7391-4F87-9AA4-1E9AC2164F40}" type="datetimeFigureOut">
               <a:rPr lang="en-US" smtClean="0"/>
-              <a:t>2/18/2022</a:t>
+              <a:t>2/19/2022</a:t>
             </a:fld>
             <a:endParaRPr lang="en-US"/>
           </a:p>
@@ -4375,7 +4375,7 @@
           <a:p>
             <a:fld id="{34891F7B-7391-4F87-9AA4-1E9AC2164F40}" type="datetimeFigureOut">
               <a:rPr lang="en-US" smtClean="0"/>
-              <a:t>2/18/2022</a:t>
+              <a:t>2/19/2022</a:t>
             </a:fld>
             <a:endParaRPr lang="en-US"/>
           </a:p>
@@ -4688,7 +4688,7 @@
           <a:p>
             <a:fld id="{34891F7B-7391-4F87-9AA4-1E9AC2164F40}" type="datetimeFigureOut">
               <a:rPr lang="en-US" smtClean="0"/>
-              <a:t>2/18/2022</a:t>
+              <a:t>2/19/2022</a:t>
             </a:fld>
             <a:endParaRPr lang="en-US"/>
           </a:p>
@@ -4952,7 +4952,7 @@
           <a:p>
             <a:fld id="{34891F7B-7391-4F87-9AA4-1E9AC2164F40}" type="datetimeFigureOut">
               <a:rPr lang="en-US" smtClean="0"/>
-              <a:t>2/18/2022</a:t>
+              <a:t>2/19/2022</a:t>
             </a:fld>
             <a:endParaRPr lang="en-US"/>
           </a:p>
@@ -5301,7 +5301,7 @@
           <a:p>
             <a:fld id="{34891F7B-7391-4F87-9AA4-1E9AC2164F40}" type="datetimeFigureOut">
               <a:rPr lang="en-US" smtClean="0"/>
-              <a:t>2/18/2022</a:t>
+              <a:t>2/19/2022</a:t>
             </a:fld>
             <a:endParaRPr lang="en-US"/>
           </a:p>
@@ -5615,7 +5615,7 @@
           <a:p>
             <a:fld id="{34891F7B-7391-4F87-9AA4-1E9AC2164F40}" type="datetimeFigureOut">
               <a:rPr lang="en-US" smtClean="0"/>
-              <a:t>2/18/2022</a:t>
+              <a:t>2/19/2022</a:t>
             </a:fld>
             <a:endParaRPr lang="en-US"/>
           </a:p>
@@ -5924,7 +5924,7 @@
           <a:p>
             <a:fld id="{34891F7B-7391-4F87-9AA4-1E9AC2164F40}" type="datetimeFigureOut">
               <a:rPr lang="en-US" smtClean="0"/>
-              <a:t>2/18/2022</a:t>
+              <a:t>2/19/2022</a:t>
             </a:fld>
             <a:endParaRPr lang="en-US"/>
           </a:p>
@@ -6313,7 +6313,7 @@
           <a:p>
             <a:fld id="{34891F7B-7391-4F87-9AA4-1E9AC2164F40}" type="datetimeFigureOut">
               <a:rPr lang="en-US" smtClean="0"/>
-              <a:t>2/18/2022</a:t>
+              <a:t>2/19/2022</a:t>
             </a:fld>
             <a:endParaRPr lang="en-US"/>
           </a:p>
@@ -6689,7 +6689,7 @@
           <a:p>
             <a:fld id="{34891F7B-7391-4F87-9AA4-1E9AC2164F40}" type="datetimeFigureOut">
               <a:rPr lang="en-US" smtClean="0"/>
-              <a:t>2/18/2022</a:t>
+              <a:t>2/19/2022</a:t>
             </a:fld>
             <a:endParaRPr lang="en-US"/>
           </a:p>
@@ -7195,7 +7195,7 @@
           <a:p>
             <a:fld id="{34891F7B-7391-4F87-9AA4-1E9AC2164F40}" type="datetimeFigureOut">
               <a:rPr lang="en-US" smtClean="0"/>
-              <a:t>2/18/2022</a:t>
+              <a:t>2/19/2022</a:t>
             </a:fld>
             <a:endParaRPr lang="en-US"/>
           </a:p>
@@ -7452,7 +7452,7 @@
           <a:p>
             <a:fld id="{34891F7B-7391-4F87-9AA4-1E9AC2164F40}" type="datetimeFigureOut">
               <a:rPr lang="en-US" smtClean="0"/>
-              <a:t>2/18/2022</a:t>
+              <a:t>2/19/2022</a:t>
             </a:fld>
             <a:endParaRPr lang="en-US"/>
           </a:p>
@@ -7615,7 +7615,7 @@
           <a:p>
             <a:fld id="{34891F7B-7391-4F87-9AA4-1E9AC2164F40}" type="datetimeFigureOut">
               <a:rPr lang="en-US" smtClean="0"/>
-              <a:t>2/18/2022</a:t>
+              <a:t>2/19/2022</a:t>
             </a:fld>
             <a:endParaRPr lang="en-US"/>
           </a:p>
@@ -8005,7 +8005,7 @@
           <a:p>
             <a:fld id="{34891F7B-7391-4F87-9AA4-1E9AC2164F40}" type="datetimeFigureOut">
               <a:rPr lang="en-US" smtClean="0"/>
-              <a:t>2/18/2022</a:t>
+              <a:t>2/19/2022</a:t>
             </a:fld>
             <a:endParaRPr lang="en-US"/>
           </a:p>
@@ -8414,7 +8414,7 @@
           <a:p>
             <a:fld id="{34891F7B-7391-4F87-9AA4-1E9AC2164F40}" type="datetimeFigureOut">
               <a:rPr lang="en-US" smtClean="0"/>
-              <a:t>2/18/2022</a:t>
+              <a:t>2/19/2022</a:t>
             </a:fld>
             <a:endParaRPr lang="en-US"/>
           </a:p>
@@ -8823,7 +8823,7 @@
           <a:p>
             <a:fld id="{34891F7B-7391-4F87-9AA4-1E9AC2164F40}" type="datetimeFigureOut">
               <a:rPr lang="en-US" smtClean="0"/>
-              <a:t>2/18/2022</a:t>
+              <a:t>2/19/2022</a:t>
             </a:fld>
             <a:endParaRPr lang="en-US"/>
           </a:p>
@@ -9159,7 +9159,7 @@
           <a:p>
             <a:fld id="{34891F7B-7391-4F87-9AA4-1E9AC2164F40}" type="datetimeFigureOut">
               <a:rPr lang="en-US" smtClean="0"/>
-              <a:t>2/18/2022</a:t>
+              <a:t>2/19/2022</a:t>
             </a:fld>
             <a:endParaRPr lang="en-US"/>
           </a:p>
@@ -9564,7 +9564,7 @@
           <a:p>
             <a:fld id="{34891F7B-7391-4F87-9AA4-1E9AC2164F40}" type="datetimeFigureOut">
               <a:rPr lang="en-US" smtClean="0"/>
-              <a:t>2/18/2022</a:t>
+              <a:t>2/19/2022</a:t>
             </a:fld>
             <a:endParaRPr lang="en-US"/>
           </a:p>
@@ -10190,7 +10190,7 @@
           <a:p>
             <a:fld id="{34891F7B-7391-4F87-9AA4-1E9AC2164F40}" type="datetimeFigureOut">
               <a:rPr lang="en-US" smtClean="0"/>
-              <a:t>2/18/2022</a:t>
+              <a:t>2/19/2022</a:t>
             </a:fld>
             <a:endParaRPr lang="en-US"/>
           </a:p>
@@ -10526,7 +10526,7 @@
           <a:p>
             <a:fld id="{34891F7B-7391-4F87-9AA4-1E9AC2164F40}" type="datetimeFigureOut">
               <a:rPr lang="en-US" smtClean="0"/>
-              <a:t>2/18/2022</a:t>
+              <a:t>2/19/2022</a:t>
             </a:fld>
             <a:endParaRPr lang="en-US"/>
           </a:p>
@@ -11207,7 +11207,7 @@
           <a:p>
             <a:fld id="{34891F7B-7391-4F87-9AA4-1E9AC2164F40}" type="datetimeFigureOut">
               <a:rPr lang="en-US" smtClean="0"/>
-              <a:t>2/18/2022</a:t>
+              <a:t>2/19/2022</a:t>
             </a:fld>
             <a:endParaRPr lang="en-US"/>
           </a:p>
@@ -12120,7 +12120,7 @@
           <a:p>
             <a:fld id="{34891F7B-7391-4F87-9AA4-1E9AC2164F40}" type="datetimeFigureOut">
               <a:rPr lang="en-US" smtClean="0"/>
-              <a:t>2/18/2022</a:t>
+              <a:t>2/19/2022</a:t>
             </a:fld>
             <a:endParaRPr lang="en-US"/>
           </a:p>
@@ -12433,7 +12433,7 @@
           <a:p>
             <a:fld id="{34891F7B-7391-4F87-9AA4-1E9AC2164F40}" type="datetimeFigureOut">
               <a:rPr lang="en-US" smtClean="0"/>
-              <a:t>2/18/2022</a:t>
+              <a:t>2/19/2022</a:t>
             </a:fld>
             <a:endParaRPr lang="en-US"/>
           </a:p>
@@ -12697,7 +12697,7 @@
           <a:p>
             <a:fld id="{34891F7B-7391-4F87-9AA4-1E9AC2164F40}" type="datetimeFigureOut">
               <a:rPr lang="en-US" smtClean="0"/>
-              <a:t>2/18/2022</a:t>
+              <a:t>2/19/2022</a:t>
             </a:fld>
             <a:endParaRPr lang="en-US"/>
           </a:p>
@@ -13082,7 +13082,7 @@
           <a:p>
             <a:fld id="{34891F7B-7391-4F87-9AA4-1E9AC2164F40}" type="datetimeFigureOut">
               <a:rPr lang="en-US" smtClean="0"/>
-              <a:t>2/18/2022</a:t>
+              <a:t>2/19/2022</a:t>
             </a:fld>
             <a:endParaRPr lang="en-US"/>
           </a:p>
@@ -13588,7 +13588,7 @@
           <a:p>
             <a:fld id="{34891F7B-7391-4F87-9AA4-1E9AC2164F40}" type="datetimeFigureOut">
               <a:rPr lang="en-US" smtClean="0"/>
-              <a:t>2/18/2022</a:t>
+              <a:t>2/19/2022</a:t>
             </a:fld>
             <a:endParaRPr lang="en-US"/>
           </a:p>
@@ -13845,7 +13845,7 @@
           <a:p>
             <a:fld id="{34891F7B-7391-4F87-9AA4-1E9AC2164F40}" type="datetimeFigureOut">
               <a:rPr lang="en-US" smtClean="0"/>
-              <a:t>2/18/2022</a:t>
+              <a:t>2/19/2022</a:t>
             </a:fld>
             <a:endParaRPr lang="en-US"/>
           </a:p>
@@ -14008,7 +14008,7 @@
           <a:p>
             <a:fld id="{34891F7B-7391-4F87-9AA4-1E9AC2164F40}" type="datetimeFigureOut">
               <a:rPr lang="en-US" smtClean="0"/>
-              <a:t>2/18/2022</a:t>
+              <a:t>2/19/2022</a:t>
             </a:fld>
             <a:endParaRPr lang="en-US"/>
           </a:p>
@@ -14398,7 +14398,7 @@
           <a:p>
             <a:fld id="{34891F7B-7391-4F87-9AA4-1E9AC2164F40}" type="datetimeFigureOut">
               <a:rPr lang="en-US" smtClean="0"/>
-              <a:t>2/18/2022</a:t>
+              <a:t>2/19/2022</a:t>
             </a:fld>
             <a:endParaRPr lang="en-US"/>
           </a:p>
@@ -14807,7 +14807,7 @@
           <a:p>
             <a:fld id="{34891F7B-7391-4F87-9AA4-1E9AC2164F40}" type="datetimeFigureOut">
               <a:rPr lang="en-US" smtClean="0"/>
-              <a:t>2/18/2022</a:t>
+              <a:t>2/19/2022</a:t>
             </a:fld>
             <a:endParaRPr lang="en-US"/>
           </a:p>
@@ -15051,7 +15051,7 @@
           <a:p>
             <a:fld id="{34891F7B-7391-4F87-9AA4-1E9AC2164F40}" type="datetimeFigureOut">
               <a:rPr lang="en-US" smtClean="0"/>
-              <a:t>2/18/2022</a:t>
+              <a:t>2/19/2022</a:t>
             </a:fld>
             <a:endParaRPr lang="en-US"/>
           </a:p>
@@ -15628,7 +15628,7 @@
           <a:p>
             <a:fld id="{34891F7B-7391-4F87-9AA4-1E9AC2164F40}" type="datetimeFigureOut">
               <a:rPr lang="en-US" smtClean="0"/>
-              <a:t>2/18/2022</a:t>
+              <a:t>2/19/2022</a:t>
             </a:fld>
             <a:endParaRPr lang="en-US"/>
           </a:p>
@@ -17664,8 +17664,8 @@
         </p:nvSpPr>
         <p:spPr>
           <a:xfrm>
-            <a:off x="680321" y="2336872"/>
-            <a:ext cx="10995123" cy="4853199"/>
+            <a:off x="680321" y="2336873"/>
+            <a:ext cx="10995123" cy="4275684"/>
           </a:xfrm>
         </p:spPr>
         <p:txBody>
@@ -17836,7 +17836,7 @@
           <a:p>
             <a:r>
               <a:rPr lang="en-US" dirty="0"/>
-              <a:t>Async</a:t>
+              <a:t>flutter</a:t>
             </a:r>
           </a:p>
           <a:p>

</xml_diff>